<commit_message>
added presentations and front end part
</commit_message>
<xml_diff>
--- a/Presentations/Presentation_template.pptx
+++ b/Presentations/Presentation_template.pptx
@@ -5,12 +5,11 @@
     <p:sldMasterId id="2147483648" r:id="rId1"/>
   </p:sldMasterIdLst>
   <p:notesMasterIdLst>
-    <p:notesMasterId r:id="rId5"/>
+    <p:notesMasterId r:id="rId4"/>
   </p:notesMasterIdLst>
   <p:sldIdLst>
     <p:sldId id="260" r:id="rId2"/>
     <p:sldId id="259" r:id="rId3"/>
-    <p:sldId id="261" r:id="rId4"/>
   </p:sldIdLst>
   <p:sldSz cx="12192000" cy="6858000"/>
   <p:notesSz cx="6858000" cy="9144000"/>
@@ -109,6 +108,11 @@
       </a:defRPr>
     </a:lvl9pPr>
   </p:defaultTextStyle>
+  <p:extLst>
+    <p:ext uri="{EFAFB233-063F-42B5-8137-9DF3F51BA10A}">
+      <p15:sldGuideLst xmlns:p15="http://schemas.microsoft.com/office/powerpoint/2012/main"/>
+    </p:ext>
+  </p:extLst>
 </p:presentation>
 </file>
 
@@ -194,7 +198,7 @@
           <a:p>
             <a:fld id="{64E0F67A-74A7-49CC-8E0C-AFF74136D0A6}" type="datetimeFigureOut">
               <a:rPr lang="ru-RU" smtClean="0"/>
-              <a:t>30.05.2016</a:t>
+              <a:t>12.07.2016</a:t>
             </a:fld>
             <a:endParaRPr lang="ru-RU"/>
           </a:p>
@@ -677,7 +681,7 @@
           <a:p>
             <a:fld id="{7146AA9B-094E-4040-B6EC-0F5576ABD2BE}" type="datetimeFigureOut">
               <a:rPr lang="ru-RU" smtClean="0"/>
-              <a:t>30.05.2016</a:t>
+              <a:t>12.07.2016</a:t>
             </a:fld>
             <a:endParaRPr lang="ru-RU"/>
           </a:p>
@@ -847,7 +851,7 @@
           <a:p>
             <a:fld id="{7146AA9B-094E-4040-B6EC-0F5576ABD2BE}" type="datetimeFigureOut">
               <a:rPr lang="ru-RU" smtClean="0"/>
-              <a:t>30.05.2016</a:t>
+              <a:t>12.07.2016</a:t>
             </a:fld>
             <a:endParaRPr lang="ru-RU"/>
           </a:p>
@@ -1027,7 +1031,7 @@
           <a:p>
             <a:fld id="{7146AA9B-094E-4040-B6EC-0F5576ABD2BE}" type="datetimeFigureOut">
               <a:rPr lang="ru-RU" smtClean="0"/>
-              <a:t>30.05.2016</a:t>
+              <a:t>12.07.2016</a:t>
             </a:fld>
             <a:endParaRPr lang="ru-RU"/>
           </a:p>
@@ -1197,7 +1201,7 @@
           <a:p>
             <a:fld id="{7146AA9B-094E-4040-B6EC-0F5576ABD2BE}" type="datetimeFigureOut">
               <a:rPr lang="ru-RU" smtClean="0"/>
-              <a:t>30.05.2016</a:t>
+              <a:t>12.07.2016</a:t>
             </a:fld>
             <a:endParaRPr lang="ru-RU"/>
           </a:p>
@@ -1443,7 +1447,7 @@
           <a:p>
             <a:fld id="{7146AA9B-094E-4040-B6EC-0F5576ABD2BE}" type="datetimeFigureOut">
               <a:rPr lang="ru-RU" smtClean="0"/>
-              <a:t>30.05.2016</a:t>
+              <a:t>12.07.2016</a:t>
             </a:fld>
             <a:endParaRPr lang="ru-RU"/>
           </a:p>
@@ -1675,7 +1679,7 @@
           <a:p>
             <a:fld id="{7146AA9B-094E-4040-B6EC-0F5576ABD2BE}" type="datetimeFigureOut">
               <a:rPr lang="ru-RU" smtClean="0"/>
-              <a:t>30.05.2016</a:t>
+              <a:t>12.07.2016</a:t>
             </a:fld>
             <a:endParaRPr lang="ru-RU"/>
           </a:p>
@@ -2042,7 +2046,7 @@
           <a:p>
             <a:fld id="{7146AA9B-094E-4040-B6EC-0F5576ABD2BE}" type="datetimeFigureOut">
               <a:rPr lang="ru-RU" smtClean="0"/>
-              <a:t>30.05.2016</a:t>
+              <a:t>12.07.2016</a:t>
             </a:fld>
             <a:endParaRPr lang="ru-RU"/>
           </a:p>
@@ -2160,7 +2164,7 @@
           <a:p>
             <a:fld id="{7146AA9B-094E-4040-B6EC-0F5576ABD2BE}" type="datetimeFigureOut">
               <a:rPr lang="ru-RU" smtClean="0"/>
-              <a:t>30.05.2016</a:t>
+              <a:t>12.07.2016</a:t>
             </a:fld>
             <a:endParaRPr lang="ru-RU"/>
           </a:p>
@@ -2255,7 +2259,7 @@
           <a:p>
             <a:fld id="{7146AA9B-094E-4040-B6EC-0F5576ABD2BE}" type="datetimeFigureOut">
               <a:rPr lang="ru-RU" smtClean="0"/>
-              <a:t>30.05.2016</a:t>
+              <a:t>12.07.2016</a:t>
             </a:fld>
             <a:endParaRPr lang="ru-RU"/>
           </a:p>
@@ -2532,7 +2536,7 @@
           <a:p>
             <a:fld id="{7146AA9B-094E-4040-B6EC-0F5576ABD2BE}" type="datetimeFigureOut">
               <a:rPr lang="ru-RU" smtClean="0"/>
-              <a:t>30.05.2016</a:t>
+              <a:t>12.07.2016</a:t>
             </a:fld>
             <a:endParaRPr lang="ru-RU"/>
           </a:p>
@@ -2785,7 +2789,7 @@
           <a:p>
             <a:fld id="{7146AA9B-094E-4040-B6EC-0F5576ABD2BE}" type="datetimeFigureOut">
               <a:rPr lang="ru-RU" smtClean="0"/>
-              <a:t>30.05.2016</a:t>
+              <a:t>12.07.2016</a:t>
             </a:fld>
             <a:endParaRPr lang="ru-RU"/>
           </a:p>
@@ -2998,7 +3002,7 @@
           <a:p>
             <a:fld id="{7146AA9B-094E-4040-B6EC-0F5576ABD2BE}" type="datetimeFigureOut">
               <a:rPr lang="ru-RU" smtClean="0"/>
-              <a:t>30.05.2016</a:t>
+              <a:t>12.07.2016</a:t>
             </a:fld>
             <a:endParaRPr lang="ru-RU"/>
           </a:p>
@@ -3465,7 +3469,13 @@
               <a:rPr lang="en-US" sz="3200" b="1" dirty="0">
                 <a:latin typeface="Garamond" panose="02020404030301010803" pitchFamily="18" charset="0"/>
               </a:rPr>
-              <a:t>of I 4.0 </a:t>
+              <a:t>of </a:t>
+            </a:r>
+            <a:r>
+              <a:rPr lang="en-US" sz="3200" b="1" dirty="0" smtClean="0">
+                <a:latin typeface="Garamond" panose="02020404030301010803" pitchFamily="18" charset="0"/>
+              </a:rPr>
+              <a:t>I4.0 </a:t>
             </a:r>
             <a:r>
               <a:rPr lang="en-US" sz="3600" b="1" dirty="0">
@@ -3556,8 +3566,8 @@
         </p:nvSpPr>
         <p:spPr>
           <a:xfrm>
-            <a:off x="7364215" y="3245476"/>
-            <a:ext cx="2071401" cy="369332"/>
+            <a:off x="7192694" y="3204533"/>
+            <a:ext cx="2242922" cy="369332"/>
           </a:xfrm>
           <a:prstGeom prst="rect">
             <a:avLst/>
@@ -3574,7 +3584,19 @@
               <a:rPr lang="en-US" u="sng" dirty="0" smtClean="0">
                 <a:latin typeface="Gentium Basic" panose="02000503060000020004" pitchFamily="2" charset="0"/>
               </a:rPr>
-              <a:t>Tutor:</a:t>
+              <a:t>Men</a:t>
+            </a:r>
+            <a:r>
+              <a:rPr lang="en-US" u="sng" dirty="0" smtClean="0">
+                <a:latin typeface="Gentium Basic" panose="02000503060000020004" pitchFamily="2" charset="0"/>
+              </a:rPr>
+              <a:t>tor</a:t>
+            </a:r>
+            <a:r>
+              <a:rPr lang="en-US" u="sng" dirty="0" smtClean="0">
+                <a:latin typeface="Gentium Basic" panose="02000503060000020004" pitchFamily="2" charset="0"/>
+              </a:rPr>
+              <a:t>:</a:t>
             </a:r>
             <a:r>
               <a:rPr lang="en-US" dirty="0" smtClean="0">
@@ -3782,236 +3804,6 @@
     <p:extLst>
       <p:ext uri="{BB962C8B-B14F-4D97-AF65-F5344CB8AC3E}">
         <p14:creationId xmlns:p14="http://schemas.microsoft.com/office/powerpoint/2010/main" val="2625621344"/>
-      </p:ext>
-    </p:extLst>
-  </p:cSld>
-  <p:clrMapOvr>
-    <a:masterClrMapping/>
-  </p:clrMapOvr>
-  <p:timing>
-    <p:tnLst>
-      <p:par>
-        <p:cTn id="1" dur="indefinite" restart="never" nodeType="tmRoot"/>
-      </p:par>
-    </p:tnLst>
-  </p:timing>
-</p:sld>
-</file>
-
-<file path=ppt/slides/slide3.xml><?xml version="1.0" encoding="utf-8"?>
-<p:sld xmlns:a="http://schemas.openxmlformats.org/drawingml/2006/main" xmlns:r="http://schemas.openxmlformats.org/officeDocument/2006/relationships" xmlns:p="http://schemas.openxmlformats.org/presentationml/2006/main">
-  <p:cSld>
-    <p:spTree>
-      <p:nvGrpSpPr>
-        <p:cNvPr id="1" name=""/>
-        <p:cNvGrpSpPr/>
-        <p:nvPr/>
-      </p:nvGrpSpPr>
-      <p:grpSpPr>
-        <a:xfrm>
-          <a:off x="0" y="0"/>
-          <a:ext cx="0" cy="0"/>
-          <a:chOff x="0" y="0"/>
-          <a:chExt cx="0" cy="0"/>
-        </a:xfrm>
-      </p:grpSpPr>
-      <p:pic>
-        <p:nvPicPr>
-          <p:cNvPr id="12" name="Рисунок 11"/>
-          <p:cNvPicPr>
-            <a:picLocks noChangeAspect="1"/>
-          </p:cNvPicPr>
-          <p:nvPr/>
-        </p:nvPicPr>
-        <p:blipFill>
-          <a:blip r:embed="rId2" cstate="print">
-            <a:extLst>
-              <a:ext uri="{28A0092B-C50C-407E-A947-70E740481C1C}">
-                <a14:useLocalDpi xmlns:a14="http://schemas.microsoft.com/office/drawing/2010/main" val="0"/>
-              </a:ext>
-            </a:extLst>
-          </a:blip>
-          <a:stretch>
-            <a:fillRect/>
-          </a:stretch>
-        </p:blipFill>
-        <p:spPr>
-          <a:xfrm>
-            <a:off x="10325333" y="6074001"/>
-            <a:ext cx="1866667" cy="666667"/>
-          </a:xfrm>
-          <a:prstGeom prst="rect">
-            <a:avLst/>
-          </a:prstGeom>
-        </p:spPr>
-      </p:pic>
-      <p:sp>
-        <p:nvSpPr>
-          <p:cNvPr id="13" name="Прямоугольник 12"/>
-          <p:cNvSpPr/>
-          <p:nvPr/>
-        </p:nvSpPr>
-        <p:spPr>
-          <a:xfrm>
-            <a:off x="0" y="0"/>
-            <a:ext cx="11303111" cy="888889"/>
-          </a:xfrm>
-          <a:prstGeom prst="rect">
-            <a:avLst/>
-          </a:prstGeom>
-          <a:solidFill>
-            <a:srgbClr val="004292"/>
-          </a:solidFill>
-          <a:ln>
-            <a:noFill/>
-          </a:ln>
-        </p:spPr>
-        <p:style>
-          <a:lnRef idx="2">
-            <a:schemeClr val="accent1">
-              <a:shade val="50000"/>
-            </a:schemeClr>
-          </a:lnRef>
-          <a:fillRef idx="1">
-            <a:schemeClr val="accent1"/>
-          </a:fillRef>
-          <a:effectRef idx="0">
-            <a:schemeClr val="accent1"/>
-          </a:effectRef>
-          <a:fontRef idx="minor">
-            <a:schemeClr val="lt1"/>
-          </a:fontRef>
-        </p:style>
-        <p:txBody>
-          <a:bodyPr rtlCol="0" anchor="ctr"/>
-          <a:lstStyle/>
-          <a:p>
-            <a:endParaRPr lang="en-US" sz="2800" b="1" dirty="0" smtClean="0">
-              <a:latin typeface="Garamond" panose="02020404030301010803" pitchFamily="18" charset="0"/>
-            </a:endParaRPr>
-          </a:p>
-          <a:p>
-            <a:r>
-              <a:rPr lang="en-US" sz="2800" b="1" dirty="0" smtClean="0">
-                <a:latin typeface="Garamond" panose="02020404030301010803" pitchFamily="18" charset="0"/>
-              </a:rPr>
-              <a:t>Integration </a:t>
-            </a:r>
-            <a:r>
-              <a:rPr lang="en-US" sz="2800" b="1" dirty="0">
-                <a:latin typeface="Garamond" panose="02020404030301010803" pitchFamily="18" charset="0"/>
-              </a:rPr>
-              <a:t>of I 4.0 </a:t>
-            </a:r>
-            <a:r>
-              <a:rPr lang="en-US" sz="3200" b="1" dirty="0">
-                <a:latin typeface="Garamond" panose="02020404030301010803" pitchFamily="18" charset="0"/>
-              </a:rPr>
-              <a:t>standards</a:t>
-            </a:r>
-            <a:endParaRPr lang="ru-RU" sz="2800" b="1" dirty="0">
-              <a:latin typeface="Garamond" panose="02020404030301010803" pitchFamily="18" charset="0"/>
-            </a:endParaRPr>
-          </a:p>
-          <a:p>
-            <a:endParaRPr lang="ru-RU" sz="2800" b="1" dirty="0">
-              <a:latin typeface="Garamond" panose="02020404030301010803" pitchFamily="18" charset="0"/>
-            </a:endParaRPr>
-          </a:p>
-        </p:txBody>
-      </p:sp>
-      <p:pic>
-        <p:nvPicPr>
-          <p:cNvPr id="14" name="Рисунок 13"/>
-          <p:cNvPicPr>
-            <a:picLocks noChangeAspect="1"/>
-          </p:cNvPicPr>
-          <p:nvPr/>
-        </p:nvPicPr>
-        <p:blipFill>
-          <a:blip r:embed="rId3" cstate="print"/>
-          <a:stretch>
-            <a:fillRect/>
-          </a:stretch>
-        </p:blipFill>
-        <p:spPr>
-          <a:xfrm>
-            <a:off x="11303111" y="0"/>
-            <a:ext cx="888889" cy="888889"/>
-          </a:xfrm>
-          <a:prstGeom prst="rect">
-            <a:avLst/>
-          </a:prstGeom>
-        </p:spPr>
-      </p:pic>
-      <p:sp>
-        <p:nvSpPr>
-          <p:cNvPr id="15" name="TextBox 14"/>
-          <p:cNvSpPr txBox="1"/>
-          <p:nvPr/>
-        </p:nvSpPr>
-        <p:spPr>
-          <a:xfrm>
-            <a:off x="217714" y="6371336"/>
-            <a:ext cx="301686" cy="369332"/>
-          </a:xfrm>
-          <a:prstGeom prst="rect">
-            <a:avLst/>
-          </a:prstGeom>
-          <a:noFill/>
-        </p:spPr>
-        <p:txBody>
-          <a:bodyPr wrap="none" rtlCol="0">
-            <a:spAutoFit/>
-          </a:bodyPr>
-          <a:lstStyle/>
-          <a:p>
-            <a:r>
-              <a:rPr lang="en-US" dirty="0"/>
-              <a:t>3</a:t>
-            </a:r>
-            <a:endParaRPr lang="ru-RU" dirty="0"/>
-          </a:p>
-        </p:txBody>
-      </p:sp>
-      <p:sp>
-        <p:nvSpPr>
-          <p:cNvPr id="6" name="TextBox 5"/>
-          <p:cNvSpPr txBox="1"/>
-          <p:nvPr/>
-        </p:nvSpPr>
-        <p:spPr>
-          <a:xfrm>
-            <a:off x="4349368" y="2480370"/>
-            <a:ext cx="3313728" cy="1569660"/>
-          </a:xfrm>
-          <a:prstGeom prst="rect">
-            <a:avLst/>
-          </a:prstGeom>
-          <a:noFill/>
-        </p:spPr>
-        <p:txBody>
-          <a:bodyPr wrap="none" rtlCol="0">
-            <a:spAutoFit/>
-          </a:bodyPr>
-          <a:lstStyle/>
-          <a:p>
-            <a:r>
-              <a:rPr lang="en-US" sz="9600" dirty="0" smtClean="0">
-                <a:latin typeface="Garamond" panose="02020404030301010803" pitchFamily="18" charset="0"/>
-              </a:rPr>
-              <a:t>Q&amp;A?</a:t>
-            </a:r>
-            <a:endParaRPr lang="ru-RU" sz="5400" dirty="0">
-              <a:latin typeface="Garamond" panose="02020404030301010803" pitchFamily="18" charset="0"/>
-            </a:endParaRPr>
-          </a:p>
-        </p:txBody>
-      </p:sp>
-    </p:spTree>
-    <p:extLst>
-      <p:ext uri="{BB962C8B-B14F-4D97-AF65-F5344CB8AC3E}">
-        <p14:creationId xmlns:p14="http://schemas.microsoft.com/office/powerpoint/2010/main" val="437215434"/>
       </p:ext>
     </p:extLst>
   </p:cSld>

</xml_diff>